<commit_message>
Created an Add Playlist button, doesn't save state
</commit_message>
<xml_diff>
--- a/Midterm Progress Report.pptx
+++ b/Midterm Progress Report.pptx
@@ -5,10 +5,10 @@
     <p:sldMasterId id="2147483648" r:id="rId4"/>
   </p:sldMasterIdLst>
   <p:notesMasterIdLst>
-    <p:notesMasterId r:id="rId18"/>
+    <p:notesMasterId r:id="rId17"/>
   </p:notesMasterIdLst>
   <p:handoutMasterIdLst>
-    <p:handoutMasterId r:id="rId19"/>
+    <p:handoutMasterId r:id="rId18"/>
   </p:handoutMasterIdLst>
   <p:sldIdLst>
     <p:sldId id="256" r:id="rId5"/>
@@ -22,8 +22,7 @@
     <p:sldId id="3863" r:id="rId13"/>
     <p:sldId id="3864" r:id="rId14"/>
     <p:sldId id="3856" r:id="rId15"/>
-    <p:sldId id="3848" r:id="rId16"/>
-    <p:sldId id="3847" r:id="rId17"/>
+    <p:sldId id="3847" r:id="rId16"/>
   </p:sldIdLst>
   <p:sldSz cx="12192000" cy="6858000"/>
   <p:notesSz cx="6858000" cy="9144000"/>
@@ -3114,7 +3113,7 @@
           <a:p>
             <a:fld id="{0DC994AA-C437-4EF4-8BEF-0B832D7FA420}" type="datetimeFigureOut">
               <a:rPr lang="en-US" smtClean="0"/>
-              <a:t>3/9/2025</a:t>
+              <a:t>3/20/2025</a:t>
             </a:fld>
             <a:endParaRPr lang="en-US" dirty="0"/>
           </a:p>
@@ -3291,7 +3290,7 @@
           <a:p>
             <a:fld id="{FB20CE03-6C3A-EB4D-A9B1-7EFD38B58412}" type="datetimeFigureOut">
               <a:rPr lang="en-US" smtClean="0"/>
-              <a:t>3/9/2025</a:t>
+              <a:t>3/20/2025</a:t>
             </a:fld>
             <a:endParaRPr lang="en-US" dirty="0"/>
           </a:p>
@@ -3792,90 +3791,6 @@
             <a:fld id="{8B57D50D-BAA9-464B-B391-243138E078D8}" type="slidenum">
               <a:rPr lang="en-US" smtClean="0"/>
               <a:t>12</a:t>
-            </a:fld>
-            <a:endParaRPr lang="en-US" dirty="0"/>
-          </a:p>
-        </p:txBody>
-      </p:sp>
-    </p:spTree>
-    <p:extLst>
-      <p:ext uri="{BB962C8B-B14F-4D97-AF65-F5344CB8AC3E}">
-        <p14:creationId xmlns:p14="http://schemas.microsoft.com/office/powerpoint/2010/main" val="737681818"/>
-      </p:ext>
-    </p:extLst>
-  </p:cSld>
-  <p:clrMapOvr>
-    <a:masterClrMapping/>
-  </p:clrMapOvr>
-</p:notes>
-</file>
-
-<file path=ppt/notesSlides/notesSlide4.xml><?xml version="1.0" encoding="utf-8"?>
-<p:notes xmlns:a="http://schemas.openxmlformats.org/drawingml/2006/main" xmlns:r="http://schemas.openxmlformats.org/officeDocument/2006/relationships" xmlns:p="http://schemas.openxmlformats.org/presentationml/2006/main">
-  <p:cSld>
-    <p:spTree>
-      <p:nvGrpSpPr>
-        <p:cNvPr id="1" name=""/>
-        <p:cNvGrpSpPr/>
-        <p:nvPr/>
-      </p:nvGrpSpPr>
-      <p:grpSpPr>
-        <a:xfrm>
-          <a:off x="0" y="0"/>
-          <a:ext cx="0" cy="0"/>
-          <a:chOff x="0" y="0"/>
-          <a:chExt cx="0" cy="0"/>
-        </a:xfrm>
-      </p:grpSpPr>
-      <p:sp>
-        <p:nvSpPr>
-          <p:cNvPr id="2" name="Slide Image Placeholder 1"/>
-          <p:cNvSpPr>
-            <a:spLocks noGrp="1" noRot="1" noChangeAspect="1"/>
-          </p:cNvSpPr>
-          <p:nvPr>
-            <p:ph type="sldImg"/>
-          </p:nvPr>
-        </p:nvSpPr>
-        <p:spPr/>
-      </p:sp>
-      <p:sp>
-        <p:nvSpPr>
-          <p:cNvPr id="3" name="Notes Placeholder 2"/>
-          <p:cNvSpPr>
-            <a:spLocks noGrp="1"/>
-          </p:cNvSpPr>
-          <p:nvPr>
-            <p:ph type="body" idx="1"/>
-          </p:nvPr>
-        </p:nvSpPr>
-        <p:spPr/>
-        <p:txBody>
-          <a:bodyPr/>
-          <a:lstStyle/>
-          <a:p>
-            <a:endParaRPr lang="en-US" dirty="0"/>
-          </a:p>
-        </p:txBody>
-      </p:sp>
-      <p:sp>
-        <p:nvSpPr>
-          <p:cNvPr id="4" name="Slide Number Placeholder 3"/>
-          <p:cNvSpPr>
-            <a:spLocks noGrp="1"/>
-          </p:cNvSpPr>
-          <p:nvPr>
-            <p:ph type="sldNum" sz="quarter" idx="5"/>
-          </p:nvPr>
-        </p:nvSpPr>
-        <p:spPr/>
-        <p:txBody>
-          <a:bodyPr/>
-          <a:lstStyle/>
-          <a:p>
-            <a:fld id="{8B57D50D-BAA9-464B-B391-243138E078D8}" type="slidenum">
-              <a:rPr lang="en-US" smtClean="0"/>
-              <a:t>13</a:t>
             </a:fld>
             <a:endParaRPr lang="en-US" dirty="0"/>
           </a:p>
@@ -5426,7 +5341,7 @@
           <a:p>
             <a:fld id="{D6D8061D-18C3-4F4F-85EF-561633F58754}" type="datetimeFigureOut">
               <a:rPr lang="en-US" smtClean="0"/>
-              <a:t>3/9/2025</a:t>
+              <a:t>3/20/2025</a:t>
             </a:fld>
             <a:endParaRPr lang="en-US" dirty="0"/>
           </a:p>
@@ -5569,7 +5484,7 @@
           <a:p>
             <a:fld id="{D6D8061D-18C3-4F4F-85EF-561633F58754}" type="datetimeFigureOut">
               <a:rPr lang="en-US" smtClean="0"/>
-              <a:t>3/9/2025</a:t>
+              <a:t>3/20/2025</a:t>
             </a:fld>
             <a:endParaRPr lang="en-US" dirty="0"/>
           </a:p>
@@ -6714,7 +6629,7 @@
           <a:p>
             <a:fld id="{D6D8061D-18C3-4F4F-85EF-561633F58754}" type="datetimeFigureOut">
               <a:rPr lang="en-US" smtClean="0"/>
-              <a:t>3/9/2025</a:t>
+              <a:t>3/20/2025</a:t>
             </a:fld>
             <a:endParaRPr lang="en-US" dirty="0"/>
           </a:p>
@@ -8037,7 +7952,7 @@
           <a:p>
             <a:fld id="{D6D8061D-18C3-4F4F-85EF-561633F58754}" type="datetimeFigureOut">
               <a:rPr lang="en-US" smtClean="0"/>
-              <a:t>3/9/2025</a:t>
+              <a:t>3/20/2025</a:t>
             </a:fld>
             <a:endParaRPr lang="en-US" dirty="0"/>
           </a:p>
@@ -9307,7 +9222,7 @@
           <a:p>
             <a:fld id="{D6D8061D-18C3-4F4F-85EF-561633F58754}" type="datetimeFigureOut">
               <a:rPr lang="en-US" smtClean="0"/>
-              <a:t>3/9/2025</a:t>
+              <a:t>3/20/2025</a:t>
             </a:fld>
             <a:endParaRPr lang="en-US" dirty="0"/>
           </a:p>
@@ -10372,7 +10287,7 @@
           <a:p>
             <a:fld id="{D6D8061D-18C3-4F4F-85EF-561633F58754}" type="datetimeFigureOut">
               <a:rPr lang="en-US" smtClean="0"/>
-              <a:t>3/9/2025</a:t>
+              <a:t>3/20/2025</a:t>
             </a:fld>
             <a:endParaRPr lang="en-US" dirty="0"/>
           </a:p>
@@ -10781,7 +10696,7 @@
           <a:p>
             <a:fld id="{D6D8061D-18C3-4F4F-85EF-561633F58754}" type="datetimeFigureOut">
               <a:rPr lang="en-US" smtClean="0"/>
-              <a:t>3/9/2025</a:t>
+              <a:t>3/20/2025</a:t>
             </a:fld>
             <a:endParaRPr lang="en-US" dirty="0"/>
           </a:p>
@@ -11752,7 +11667,7 @@
           <a:p>
             <a:fld id="{D6D8061D-18C3-4F4F-85EF-561633F58754}" type="datetimeFigureOut">
               <a:rPr lang="en-US" smtClean="0"/>
-              <a:t>3/9/2025</a:t>
+              <a:t>3/20/2025</a:t>
             </a:fld>
             <a:endParaRPr lang="en-US" dirty="0"/>
           </a:p>
@@ -12589,7 +12504,7 @@
           <a:p>
             <a:fld id="{D6D8061D-18C3-4F4F-85EF-561633F58754}" type="datetimeFigureOut">
               <a:rPr lang="en-US" smtClean="0"/>
-              <a:t>3/9/2025</a:t>
+              <a:t>3/20/2025</a:t>
             </a:fld>
             <a:endParaRPr lang="en-US" dirty="0"/>
           </a:p>
@@ -12830,7 +12745,7 @@
           <a:p>
             <a:fld id="{D6D8061D-18C3-4F4F-85EF-561633F58754}" type="datetimeFigureOut">
               <a:rPr lang="en-US" smtClean="0"/>
-              <a:t>3/9/2025</a:t>
+              <a:t>3/20/2025</a:t>
             </a:fld>
             <a:endParaRPr lang="en-US" dirty="0"/>
           </a:p>
@@ -13663,216 +13578,6 @@
           <p:cNvPr id="2" name="Title 1">
             <a:extLst>
               <a:ext uri="{FF2B5EF4-FFF2-40B4-BE49-F238E27FC236}">
-                <a16:creationId xmlns:a16="http://schemas.microsoft.com/office/drawing/2014/main" id="{5D030A76-B788-B363-104E-266B7C7F7208}"/>
-              </a:ext>
-            </a:extLst>
-          </p:cNvPr>
-          <p:cNvSpPr>
-            <a:spLocks noGrp="1"/>
-          </p:cNvSpPr>
-          <p:nvPr>
-            <p:ph type="title"/>
-          </p:nvPr>
-        </p:nvSpPr>
-        <p:spPr>
-          <a:xfrm>
-            <a:off x="838200" y="365125"/>
-            <a:ext cx="10515600" cy="1325563"/>
-          </a:xfrm>
-          <a:noFill/>
-        </p:spPr>
-        <p:txBody>
-          <a:bodyPr anchor="ctr"/>
-          <a:lstStyle/>
-          <a:p>
-            <a:r>
-              <a:rPr lang="en-US" dirty="0"/>
-              <a:t>Final tips &amp; takeaways</a:t>
-            </a:r>
-          </a:p>
-        </p:txBody>
-      </p:sp>
-      <p:sp>
-        <p:nvSpPr>
-          <p:cNvPr id="3" name="Content Placeholder 2">
-            <a:extLst>
-              <a:ext uri="{FF2B5EF4-FFF2-40B4-BE49-F238E27FC236}">
-                <a16:creationId xmlns:a16="http://schemas.microsoft.com/office/drawing/2014/main" id="{05948542-FCE1-3AE6-C6C9-17975609DF70}"/>
-              </a:ext>
-            </a:extLst>
-          </p:cNvPr>
-          <p:cNvSpPr>
-            <a:spLocks noGrp="1"/>
-          </p:cNvSpPr>
-          <p:nvPr>
-            <p:ph sz="half" idx="13"/>
-          </p:nvPr>
-        </p:nvSpPr>
-        <p:spPr>
-          <a:xfrm>
-            <a:off x="838200" y="1825625"/>
-            <a:ext cx="6934200" cy="4297680"/>
-          </a:xfrm>
-          <a:noFill/>
-        </p:spPr>
-        <p:txBody>
-          <a:bodyPr vert="horz" lIns="91440" tIns="45720" rIns="91440" bIns="45720" rtlCol="0" anchor="t">
-            <a:normAutofit/>
-          </a:bodyPr>
-          <a:lstStyle/>
-          <a:p>
-            <a:r>
-              <a:rPr lang="en-US" dirty="0"/>
-              <a:t>Consistent rehearsal</a:t>
-            </a:r>
-          </a:p>
-          <a:p>
-            <a:pPr lvl="1"/>
-            <a:r>
-              <a:rPr lang="en-US" dirty="0"/>
-              <a:t>Strengthen your familiarity</a:t>
-            </a:r>
-          </a:p>
-          <a:p>
-            <a:r>
-              <a:rPr lang="en-US" dirty="0"/>
-              <a:t>Refine delivery style</a:t>
-            </a:r>
-          </a:p>
-          <a:p>
-            <a:pPr lvl="1"/>
-            <a:r>
-              <a:rPr lang="en-US" dirty="0"/>
-              <a:t>Pacing, tone, and emphasis</a:t>
-            </a:r>
-          </a:p>
-          <a:p>
-            <a:r>
-              <a:rPr lang="en-US" dirty="0"/>
-              <a:t>Timing and transitions</a:t>
-            </a:r>
-          </a:p>
-          <a:p>
-            <a:pPr lvl="1"/>
-            <a:r>
-              <a:rPr lang="en-US" dirty="0"/>
-              <a:t>Aim for seamless, professional delivery</a:t>
-            </a:r>
-          </a:p>
-          <a:p>
-            <a:r>
-              <a:rPr lang="en-US" dirty="0"/>
-              <a:t>Practice audience</a:t>
-            </a:r>
-          </a:p>
-          <a:p>
-            <a:pPr lvl="1"/>
-            <a:r>
-              <a:rPr lang="en-US" dirty="0"/>
-              <a:t>Enlist colleagues to listen &amp; provide feedback</a:t>
-            </a:r>
-          </a:p>
-          <a:p>
-            <a:pPr lvl="1"/>
-            <a:endParaRPr lang="en-US" dirty="0"/>
-          </a:p>
-        </p:txBody>
-      </p:sp>
-      <p:sp>
-        <p:nvSpPr>
-          <p:cNvPr id="4" name="Content Placeholder 3">
-            <a:extLst>
-              <a:ext uri="{FF2B5EF4-FFF2-40B4-BE49-F238E27FC236}">
-                <a16:creationId xmlns:a16="http://schemas.microsoft.com/office/drawing/2014/main" id="{3EE67564-0457-E486-97D0-8109D2C97B3F}"/>
-              </a:ext>
-            </a:extLst>
-          </p:cNvPr>
-          <p:cNvSpPr>
-            <a:spLocks noGrp="1"/>
-          </p:cNvSpPr>
-          <p:nvPr>
-            <p:ph sz="half" idx="2"/>
-          </p:nvPr>
-        </p:nvSpPr>
-        <p:spPr>
-          <a:xfrm>
-            <a:off x="7903029" y="1825625"/>
-            <a:ext cx="3450771" cy="4297680"/>
-          </a:xfrm>
-          <a:noFill/>
-        </p:spPr>
-        <p:txBody>
-          <a:bodyPr>
-            <a:normAutofit/>
-          </a:bodyPr>
-          <a:lstStyle/>
-          <a:p>
-            <a:r>
-              <a:rPr lang="en-US" dirty="0"/>
-              <a:t>Seek feedback</a:t>
-            </a:r>
-          </a:p>
-          <a:p>
-            <a:r>
-              <a:rPr lang="en-US" dirty="0"/>
-              <a:t>Reflect on performance</a:t>
-            </a:r>
-          </a:p>
-          <a:p>
-            <a:r>
-              <a:rPr lang="en-US" dirty="0"/>
-              <a:t>Explore new techniques</a:t>
-            </a:r>
-          </a:p>
-          <a:p>
-            <a:r>
-              <a:rPr lang="en-US" dirty="0"/>
-              <a:t>Set personal goals</a:t>
-            </a:r>
-          </a:p>
-          <a:p>
-            <a:r>
-              <a:rPr lang="en-US" dirty="0"/>
-              <a:t>Iterate and adapt</a:t>
-            </a:r>
-          </a:p>
-        </p:txBody>
-      </p:sp>
-    </p:spTree>
-    <p:extLst>
-      <p:ext uri="{BB962C8B-B14F-4D97-AF65-F5344CB8AC3E}">
-        <p14:creationId xmlns:p14="http://schemas.microsoft.com/office/powerpoint/2010/main" val="414613742"/>
-      </p:ext>
-    </p:extLst>
-  </p:cSld>
-  <p:clrMapOvr>
-    <a:masterClrMapping/>
-  </p:clrMapOvr>
-</p:sld>
-</file>
-
-<file path=ppt/slides/slide13.xml><?xml version="1.0" encoding="utf-8"?>
-<p:sld xmlns:a="http://schemas.openxmlformats.org/drawingml/2006/main" xmlns:r="http://schemas.openxmlformats.org/officeDocument/2006/relationships" xmlns:p="http://schemas.openxmlformats.org/presentationml/2006/main">
-  <p:cSld>
-    <p:spTree>
-      <p:nvGrpSpPr>
-        <p:cNvPr id="1" name=""/>
-        <p:cNvGrpSpPr/>
-        <p:nvPr/>
-      </p:nvGrpSpPr>
-      <p:grpSpPr>
-        <a:xfrm>
-          <a:off x="0" y="0"/>
-          <a:ext cx="0" cy="0"/>
-          <a:chOff x="0" y="0"/>
-          <a:chExt cx="0" cy="0"/>
-        </a:xfrm>
-      </p:grpSpPr>
-      <p:sp>
-        <p:nvSpPr>
-          <p:cNvPr id="2" name="Title 1">
-            <a:extLst>
-              <a:ext uri="{FF2B5EF4-FFF2-40B4-BE49-F238E27FC236}">
                 <a16:creationId xmlns:a16="http://schemas.microsoft.com/office/drawing/2014/main" id="{28BAC361-0D7A-DC05-86B5-6DD77D322F5B}"/>
               </a:ext>
             </a:extLst>
@@ -13933,26 +13638,15 @@
           <a:p>
             <a:r>
               <a:rPr lang="en-US" dirty="0"/>
-              <a:t>Brita Tamm</a:t>
+              <a:t>Justin Joseph</a:t>
             </a:r>
           </a:p>
           <a:p>
             <a:r>
-              <a:rPr lang="en-US" dirty="0"/>
-              <a:t>502-555-0152</a:t>
+              <a:rPr lang="en-US"/>
+              <a:t>jjoseph4@my.harrisburgu.edu</a:t>
             </a:r>
-          </a:p>
-          <a:p>
-            <a:r>
-              <a:rPr lang="en-US" dirty="0"/>
-              <a:t>brita@firstupconsultants.com</a:t>
-            </a:r>
-          </a:p>
-          <a:p>
-            <a:r>
-              <a:rPr lang="en-US" dirty="0"/>
-              <a:t>www.firstupconsultants.com</a:t>
-            </a:r>
+            <a:endParaRPr lang="en-US" dirty="0"/>
           </a:p>
         </p:txBody>
       </p:sp>
@@ -15985,35 +15679,6 @@
 </file>
 
 <file path=customXml/item1.xml><?xml version="1.0" encoding="utf-8"?>
-<p:properties xmlns:p="http://schemas.microsoft.com/office/2006/metadata/properties" xmlns:xsi="http://www.w3.org/2001/XMLSchema-instance" xmlns:pc="http://schemas.microsoft.com/office/infopath/2007/PartnerControls">
-  <documentManagement>
-    <_ip_UnifiedCompliancePolicyUIAction xmlns="http://schemas.microsoft.com/sharepoint/v3" xsi:nil="true"/>
-    <Image xmlns="71af3243-3dd4-4a8d-8c0d-dd76da1f02a5">
-      <Url xsi:nil="true"/>
-      <Description xsi:nil="true"/>
-    </Image>
-    <Status xmlns="71af3243-3dd4-4a8d-8c0d-dd76da1f02a5">Not started</Status>
-    <Background xmlns="71af3243-3dd4-4a8d-8c0d-dd76da1f02a5">false</Background>
-    <_ip_UnifiedCompliancePolicyProperties xmlns="http://schemas.microsoft.com/sharepoint/v3" xsi:nil="true"/>
-    <ImageTagsTaxHTField xmlns="71af3243-3dd4-4a8d-8c0d-dd76da1f02a5">
-      <Terms xmlns="http://schemas.microsoft.com/office/infopath/2007/PartnerControls"/>
-    </ImageTagsTaxHTField>
-    <TaxCatchAll xmlns="230e9df3-be65-4c73-a93b-d1236ebd677e" xsi:nil="true"/>
-    <MediaServiceKeyPoints xmlns="71af3243-3dd4-4a8d-8c0d-dd76da1f02a5" xsi:nil="true"/>
-  </documentManagement>
-</p:properties>
-</file>
-
-<file path=customXml/item2.xml><?xml version="1.0" encoding="utf-8"?>
-<?mso-contentType ?>
-<FormTemplates xmlns="http://schemas.microsoft.com/sharepoint/v3/contenttype/forms">
-  <Display>DocumentLibraryForm</Display>
-  <Edit>DocumentLibraryForm</Edit>
-  <New>DocumentLibraryForm</New>
-</FormTemplates>
-</file>
-
-<file path=customXml/item3.xml><?xml version="1.0" encoding="utf-8"?>
 <ct:contentTypeSchema xmlns:ct="http://schemas.microsoft.com/office/2006/metadata/contentType" xmlns:ma="http://schemas.microsoft.com/office/2006/metadata/properties/metaAttributes" ct:_="" ma:_="" ma:contentTypeName="Document" ma:contentTypeID="0x01010079F111ED35F8CC479449609E8A0923A6" ma:contentTypeVersion="28" ma:contentTypeDescription="Create a new document." ma:contentTypeScope="" ma:versionID="60f5a4f2d2b0abadcf532d48ebf9cb71">
   <xsd:schema xmlns:xsd="http://www.w3.org/2001/XMLSchema" xmlns:xs="http://www.w3.org/2001/XMLSchema" xmlns:p="http://schemas.microsoft.com/office/2006/metadata/properties" xmlns:ns1="http://schemas.microsoft.com/sharepoint/v3" xmlns:ns2="71af3243-3dd4-4a8d-8c0d-dd76da1f02a5" xmlns:ns3="16c05727-aa75-4e4a-9b5f-8a80a1165891" xmlns:ns4="230e9df3-be65-4c73-a93b-d1236ebd677e" targetNamespace="http://schemas.microsoft.com/office/2006/metadata/properties" ma:root="true" ma:fieldsID="7dd78129e6a1811f84807ad11c651531" ns1:_="" ns2:_="" ns3:_="" ns4:_="">
     <xsd:import namespace="http://schemas.microsoft.com/sharepoint/v3"/>
@@ -16325,27 +15990,36 @@
 </ct:contentTypeSchema>
 </file>
 
-<file path=customXml/itemProps1.xml><?xml version="1.0" encoding="utf-8"?>
-<ds:datastoreItem xmlns:ds="http://schemas.openxmlformats.org/officeDocument/2006/customXml" ds:itemID="{E130005B-6102-4F3C-A26F-485DF1BF9717}">
-  <ds:schemaRefs>
-    <ds:schemaRef ds:uri="http://schemas.microsoft.com/office/2006/metadata/properties"/>
-    <ds:schemaRef ds:uri="http://schemas.microsoft.com/office/infopath/2007/PartnerControls"/>
-    <ds:schemaRef ds:uri="http://schemas.microsoft.com/sharepoint/v3"/>
-    <ds:schemaRef ds:uri="71af3243-3dd4-4a8d-8c0d-dd76da1f02a5"/>
-    <ds:schemaRef ds:uri="230e9df3-be65-4c73-a93b-d1236ebd677e"/>
-  </ds:schemaRefs>
-</ds:datastoreItem>
+<file path=customXml/item2.xml><?xml version="1.0" encoding="utf-8"?>
+<?mso-contentType ?>
+<FormTemplates xmlns="http://schemas.microsoft.com/sharepoint/v3/contenttype/forms">
+  <Display>DocumentLibraryForm</Display>
+  <Edit>DocumentLibraryForm</Edit>
+  <New>DocumentLibraryForm</New>
+</FormTemplates>
 </file>
 
-<file path=customXml/itemProps2.xml><?xml version="1.0" encoding="utf-8"?>
-<ds:datastoreItem xmlns:ds="http://schemas.openxmlformats.org/officeDocument/2006/customXml" ds:itemID="{4E60708A-6461-4D7F-883F-7E25D731D326}">
-  <ds:schemaRefs>
-    <ds:schemaRef ds:uri="http://schemas.microsoft.com/sharepoint/v3/contenttype/forms"/>
-  </ds:schemaRefs>
-</ds:datastoreItem>
+<file path=customXml/item3.xml><?xml version="1.0" encoding="utf-8"?>
+<p:properties xmlns:p="http://schemas.microsoft.com/office/2006/metadata/properties" xmlns:xsi="http://www.w3.org/2001/XMLSchema-instance" xmlns:pc="http://schemas.microsoft.com/office/infopath/2007/PartnerControls">
+  <documentManagement>
+    <_ip_UnifiedCompliancePolicyUIAction xmlns="http://schemas.microsoft.com/sharepoint/v3" xsi:nil="true"/>
+    <Image xmlns="71af3243-3dd4-4a8d-8c0d-dd76da1f02a5">
+      <Url xsi:nil="true"/>
+      <Description xsi:nil="true"/>
+    </Image>
+    <Status xmlns="71af3243-3dd4-4a8d-8c0d-dd76da1f02a5">Not started</Status>
+    <Background xmlns="71af3243-3dd4-4a8d-8c0d-dd76da1f02a5">false</Background>
+    <_ip_UnifiedCompliancePolicyProperties xmlns="http://schemas.microsoft.com/sharepoint/v3" xsi:nil="true"/>
+    <ImageTagsTaxHTField xmlns="71af3243-3dd4-4a8d-8c0d-dd76da1f02a5">
+      <Terms xmlns="http://schemas.microsoft.com/office/infopath/2007/PartnerControls"/>
+    </ImageTagsTaxHTField>
+    <TaxCatchAll xmlns="230e9df3-be65-4c73-a93b-d1236ebd677e" xsi:nil="true"/>
+    <MediaServiceKeyPoints xmlns="71af3243-3dd4-4a8d-8c0d-dd76da1f02a5" xsi:nil="true"/>
+  </documentManagement>
+</p:properties>
 </file>
 
-<file path=customXml/itemProps3.xml><?xml version="1.0" encoding="utf-8"?>
+<file path=customXml/itemProps1.xml><?xml version="1.0" encoding="utf-8"?>
 <ds:datastoreItem xmlns:ds="http://schemas.openxmlformats.org/officeDocument/2006/customXml" ds:itemID="{2BC90B52-91C7-4BE9-8AE0-180FFFE1100A}">
   <ds:schemaRefs>
     <ds:schemaRef ds:uri="http://schemas.microsoft.com/office/2006/metadata/contentType"/>
@@ -16366,6 +16040,26 @@
 </ds:datastoreItem>
 </file>
 
+<file path=customXml/itemProps2.xml><?xml version="1.0" encoding="utf-8"?>
+<ds:datastoreItem xmlns:ds="http://schemas.openxmlformats.org/officeDocument/2006/customXml" ds:itemID="{4E60708A-6461-4D7F-883F-7E25D731D326}">
+  <ds:schemaRefs>
+    <ds:schemaRef ds:uri="http://schemas.microsoft.com/sharepoint/v3/contenttype/forms"/>
+  </ds:schemaRefs>
+</ds:datastoreItem>
+</file>
+
+<file path=customXml/itemProps3.xml><?xml version="1.0" encoding="utf-8"?>
+<ds:datastoreItem xmlns:ds="http://schemas.openxmlformats.org/officeDocument/2006/customXml" ds:itemID="{E130005B-6102-4F3C-A26F-485DF1BF9717}">
+  <ds:schemaRefs>
+    <ds:schemaRef ds:uri="http://schemas.microsoft.com/office/2006/metadata/properties"/>
+    <ds:schemaRef ds:uri="http://schemas.microsoft.com/office/infopath/2007/PartnerControls"/>
+    <ds:schemaRef ds:uri="http://schemas.microsoft.com/sharepoint/v3"/>
+    <ds:schemaRef ds:uri="71af3243-3dd4-4a8d-8c0d-dd76da1f02a5"/>
+    <ds:schemaRef ds:uri="230e9df3-be65-4c73-a93b-d1236ebd677e"/>
+  </ds:schemaRefs>
+</ds:datastoreItem>
+</file>
+
 <file path=docMetadata/LabelInfo.xml><?xml version="1.0" encoding="utf-8"?>
 <clbl:labelList xmlns:clbl="http://schemas.microsoft.com/office/2020/mipLabelMetadata"/>
 </file>
</xml_diff>